<commit_message>
Add exception presentation, code changes and array problems
</commit_message>
<xml_diff>
--- a/String/Presentation/Array, String, StringBuffer and StringBuilder.pptx
+++ b/String/Presentation/Array, String, StringBuffer and StringBuilder.pptx
@@ -252,7 +252,7 @@
             <a:fld id="{8575B1C5-E76A-4744-80D9-398B2BD630C5}" type="datetimeFigureOut">
               <a:rPr lang="en-US" altLang="en-US"/>
               <a:pPr/>
-              <a:t>9/28/22</a:t>
+              <a:t>10/1/22</a:t>
             </a:fld>
             <a:endParaRPr lang="en-US" altLang="en-US"/>
           </a:p>
@@ -5339,7 +5339,7 @@
               <a:rPr lang="en-US" altLang="en-US" dirty="0" err="1">
                 <a:latin typeface="Calibri" panose="020F0502020204030204" pitchFamily="34" charset="0"/>
               </a:rPr>
-              <a:t>begin.int</a:t>
+              <a:t>begin,int</a:t>
             </a:r>
             <a:r>
               <a:rPr lang="en-US" altLang="en-US" dirty="0">
@@ -5455,7 +5455,7 @@
               <a:rPr lang="en-US" altLang="en-US" dirty="0" err="1">
                 <a:latin typeface="Calibri" panose="020F0502020204030204" pitchFamily="34" charset="0"/>
               </a:rPr>
-              <a:t>begin.int</a:t>
+              <a:t>begin,int</a:t>
             </a:r>
             <a:r>
               <a:rPr lang="en-US" altLang="en-US" dirty="0">
@@ -6785,6 +6785,249 @@
           </a:p>
         </p:txBody>
       </p:sp>
+      <p:graphicFrame>
+        <p:nvGraphicFramePr>
+          <p:cNvPr id="3" name="Table 3">
+            <a:extLst>
+              <a:ext uri="{FF2B5EF4-FFF2-40B4-BE49-F238E27FC236}">
+                <a16:creationId xmlns:a16="http://schemas.microsoft.com/office/drawing/2014/main" id="{10978885-C4B3-43D9-AB97-4E045ACCB22A}"/>
+              </a:ext>
+            </a:extLst>
+          </p:cNvPr>
+          <p:cNvGraphicFramePr>
+            <a:graphicFrameLocks noGrp="1"/>
+          </p:cNvGraphicFramePr>
+          <p:nvPr>
+            <p:extLst>
+              <p:ext uri="{D42A27DB-BD31-4B8C-83A1-F6EECF244321}">
+                <p14:modId xmlns:p14="http://schemas.microsoft.com/office/powerpoint/2010/main" val="3746139938"/>
+              </p:ext>
+            </p:extLst>
+          </p:nvPr>
+        </p:nvGraphicFramePr>
+        <p:xfrm>
+          <a:off x="1219200" y="5486400"/>
+          <a:ext cx="6096000" cy="370840"/>
+        </p:xfrm>
+        <a:graphic>
+          <a:graphicData uri="http://schemas.openxmlformats.org/drawingml/2006/table">
+            <a:tbl>
+              <a:tblPr firstRow="1" bandRow="1">
+                <a:tableStyleId>{5C22544A-7EE6-4342-B048-85BDC9FD1C3A}</a:tableStyleId>
+              </a:tblPr>
+              <a:tblGrid>
+                <a:gridCol w="609600">
+                  <a:extLst>
+                    <a:ext uri="{9D8B030D-6E8A-4147-A177-3AD203B41FA5}">
+                      <a16:colId xmlns:a16="http://schemas.microsoft.com/office/drawing/2014/main" val="2181763093"/>
+                    </a:ext>
+                  </a:extLst>
+                </a:gridCol>
+                <a:gridCol w="609600">
+                  <a:extLst>
+                    <a:ext uri="{9D8B030D-6E8A-4147-A177-3AD203B41FA5}">
+                      <a16:colId xmlns:a16="http://schemas.microsoft.com/office/drawing/2014/main" val="81447292"/>
+                    </a:ext>
+                  </a:extLst>
+                </a:gridCol>
+                <a:gridCol w="609600">
+                  <a:extLst>
+                    <a:ext uri="{9D8B030D-6E8A-4147-A177-3AD203B41FA5}">
+                      <a16:colId xmlns:a16="http://schemas.microsoft.com/office/drawing/2014/main" val="3786523012"/>
+                    </a:ext>
+                  </a:extLst>
+                </a:gridCol>
+                <a:gridCol w="609600">
+                  <a:extLst>
+                    <a:ext uri="{9D8B030D-6E8A-4147-A177-3AD203B41FA5}">
+                      <a16:colId xmlns:a16="http://schemas.microsoft.com/office/drawing/2014/main" val="1010215397"/>
+                    </a:ext>
+                  </a:extLst>
+                </a:gridCol>
+                <a:gridCol w="609600">
+                  <a:extLst>
+                    <a:ext uri="{9D8B030D-6E8A-4147-A177-3AD203B41FA5}">
+                      <a16:colId xmlns:a16="http://schemas.microsoft.com/office/drawing/2014/main" val="1917960096"/>
+                    </a:ext>
+                  </a:extLst>
+                </a:gridCol>
+                <a:gridCol w="609600">
+                  <a:extLst>
+                    <a:ext uri="{9D8B030D-6E8A-4147-A177-3AD203B41FA5}">
+                      <a16:colId xmlns:a16="http://schemas.microsoft.com/office/drawing/2014/main" val="1855934093"/>
+                    </a:ext>
+                  </a:extLst>
+                </a:gridCol>
+                <a:gridCol w="609600">
+                  <a:extLst>
+                    <a:ext uri="{9D8B030D-6E8A-4147-A177-3AD203B41FA5}">
+                      <a16:colId xmlns:a16="http://schemas.microsoft.com/office/drawing/2014/main" val="469274844"/>
+                    </a:ext>
+                  </a:extLst>
+                </a:gridCol>
+                <a:gridCol w="609600">
+                  <a:extLst>
+                    <a:ext uri="{9D8B030D-6E8A-4147-A177-3AD203B41FA5}">
+                      <a16:colId xmlns:a16="http://schemas.microsoft.com/office/drawing/2014/main" val="998990027"/>
+                    </a:ext>
+                  </a:extLst>
+                </a:gridCol>
+                <a:gridCol w="609600">
+                  <a:extLst>
+                    <a:ext uri="{9D8B030D-6E8A-4147-A177-3AD203B41FA5}">
+                      <a16:colId xmlns:a16="http://schemas.microsoft.com/office/drawing/2014/main" val="1468741705"/>
+                    </a:ext>
+                  </a:extLst>
+                </a:gridCol>
+                <a:gridCol w="609600">
+                  <a:extLst>
+                    <a:ext uri="{9D8B030D-6E8A-4147-A177-3AD203B41FA5}">
+                      <a16:colId xmlns:a16="http://schemas.microsoft.com/office/drawing/2014/main" val="1494531335"/>
+                    </a:ext>
+                  </a:extLst>
+                </a:gridCol>
+              </a:tblGrid>
+              <a:tr h="370840">
+                <a:tc>
+                  <a:txBody>
+                    <a:bodyPr/>
+                    <a:lstStyle/>
+                    <a:p>
+                      <a:r>
+                        <a:rPr lang="en-US" dirty="0"/>
+                        <a:t>0</a:t>
+                      </a:r>
+                    </a:p>
+                  </a:txBody>
+                  <a:tcPr/>
+                </a:tc>
+                <a:tc>
+                  <a:txBody>
+                    <a:bodyPr/>
+                    <a:lstStyle/>
+                    <a:p>
+                      <a:r>
+                        <a:rPr lang="en-US" dirty="0"/>
+                        <a:t>1</a:t>
+                      </a:r>
+                    </a:p>
+                  </a:txBody>
+                  <a:tcPr/>
+                </a:tc>
+                <a:tc>
+                  <a:txBody>
+                    <a:bodyPr/>
+                    <a:lstStyle/>
+                    <a:p>
+                      <a:r>
+                        <a:rPr lang="en-US" dirty="0"/>
+                        <a:t>2</a:t>
+                      </a:r>
+                    </a:p>
+                  </a:txBody>
+                  <a:tcPr/>
+                </a:tc>
+                <a:tc>
+                  <a:txBody>
+                    <a:bodyPr/>
+                    <a:lstStyle/>
+                    <a:p>
+                      <a:r>
+                        <a:rPr lang="en-US" dirty="0"/>
+                        <a:t>3</a:t>
+                      </a:r>
+                    </a:p>
+                  </a:txBody>
+                  <a:tcPr/>
+                </a:tc>
+                <a:tc>
+                  <a:txBody>
+                    <a:bodyPr/>
+                    <a:lstStyle/>
+                    <a:p>
+                      <a:r>
+                        <a:rPr lang="en-US" dirty="0"/>
+                        <a:t>4</a:t>
+                      </a:r>
+                    </a:p>
+                  </a:txBody>
+                  <a:tcPr/>
+                </a:tc>
+                <a:tc>
+                  <a:txBody>
+                    <a:bodyPr/>
+                    <a:lstStyle/>
+                    <a:p>
+                      <a:r>
+                        <a:rPr lang="en-US" dirty="0"/>
+                        <a:t>5</a:t>
+                      </a:r>
+                    </a:p>
+                  </a:txBody>
+                  <a:tcPr/>
+                </a:tc>
+                <a:tc>
+                  <a:txBody>
+                    <a:bodyPr/>
+                    <a:lstStyle/>
+                    <a:p>
+                      <a:r>
+                        <a:rPr lang="en-US" dirty="0"/>
+                        <a:t>6</a:t>
+                      </a:r>
+                    </a:p>
+                  </a:txBody>
+                  <a:tcPr/>
+                </a:tc>
+                <a:tc>
+                  <a:txBody>
+                    <a:bodyPr/>
+                    <a:lstStyle/>
+                    <a:p>
+                      <a:r>
+                        <a:rPr lang="en-US" dirty="0"/>
+                        <a:t>7</a:t>
+                      </a:r>
+                    </a:p>
+                  </a:txBody>
+                  <a:tcPr/>
+                </a:tc>
+                <a:tc>
+                  <a:txBody>
+                    <a:bodyPr/>
+                    <a:lstStyle/>
+                    <a:p>
+                      <a:r>
+                        <a:rPr lang="en-US" dirty="0"/>
+                        <a:t>8</a:t>
+                      </a:r>
+                    </a:p>
+                  </a:txBody>
+                  <a:tcPr/>
+                </a:tc>
+                <a:tc>
+                  <a:txBody>
+                    <a:bodyPr/>
+                    <a:lstStyle/>
+                    <a:p>
+                      <a:r>
+                        <a:rPr lang="en-US" dirty="0"/>
+                        <a:t>9</a:t>
+                      </a:r>
+                    </a:p>
+                  </a:txBody>
+                  <a:tcPr/>
+                </a:tc>
+                <a:extLst>
+                  <a:ext uri="{0D108BD9-81ED-4DB2-BD59-A6C34878D82A}">
+                    <a16:rowId xmlns:a16="http://schemas.microsoft.com/office/drawing/2014/main" val="1255519402"/>
+                  </a:ext>
+                </a:extLst>
+              </a:tr>
+            </a:tbl>
+          </a:graphicData>
+        </a:graphic>
+      </p:graphicFrame>
     </p:spTree>
   </p:cSld>
   <p:clrMapOvr>

</xml_diff>